<commit_message>
update diagram with net core
</commit_message>
<xml_diff>
--- a/docs/PM HMI example diagram.pptx
+++ b/docs/PM HMI example diagram.pptx
@@ -5420,7 +5420,7 @@
         </p:blipFill>
         <p:spPr bwMode="auto">
           <a:xfrm>
-            <a:off x="8010037" y="2959861"/>
+            <a:off x="8021756" y="3774361"/>
             <a:ext cx="796306" cy="796306"/>
           </a:xfrm>
           <a:prstGeom prst="rect">
@@ -5467,7 +5467,7 @@
         </p:blipFill>
         <p:spPr bwMode="auto">
           <a:xfrm>
-            <a:off x="7604226" y="3861918"/>
+            <a:off x="7615945" y="4676418"/>
             <a:ext cx="1607927" cy="466569"/>
           </a:xfrm>
           <a:prstGeom prst="rect">
@@ -5514,8 +5514,55 @@
         </p:blipFill>
         <p:spPr bwMode="auto">
           <a:xfrm>
-            <a:off x="7867425" y="4356624"/>
+            <a:off x="7879144" y="5171124"/>
             <a:ext cx="1202116" cy="402771"/>
+          </a:xfrm>
+          <a:prstGeom prst="rect">
+            <a:avLst/>
+          </a:prstGeom>
+          <a:noFill/>
+          <a:extLst>
+            <a:ext uri="{909E8E84-426E-40DD-AFC4-6F175D3DCCD1}">
+              <a14:hiddenFill xmlns:a14="http://schemas.microsoft.com/office/drawing/2010/main">
+                <a:solidFill>
+                  <a:srgbClr val="FFFFFF"/>
+                </a:solidFill>
+              </a14:hiddenFill>
+            </a:ext>
+          </a:extLst>
+        </p:spPr>
+      </p:pic>
+      <p:pic>
+        <p:nvPicPr>
+          <p:cNvPr id="1036" name="Picture 12" descr="Fin de soporte de .NET Core 3 ¿y ahora qué? – Jorge Serrano">
+            <a:extLst>
+              <a:ext uri="{FF2B5EF4-FFF2-40B4-BE49-F238E27FC236}">
+                <a16:creationId xmlns:a16="http://schemas.microsoft.com/office/drawing/2014/main" id="{36E71182-96DC-4285-AC73-C56605152D58}"/>
+              </a:ext>
+            </a:extLst>
+          </p:cNvPr>
+          <p:cNvPicPr>
+            <a:picLocks noChangeAspect="1" noChangeArrowheads="1"/>
+          </p:cNvPicPr>
+          <p:nvPr/>
+        </p:nvPicPr>
+        <p:blipFill>
+          <a:blip r:embed="rId8">
+            <a:extLst>
+              <a:ext uri="{28A0092B-C50C-407E-A947-70E740481C1C}">
+                <a14:useLocalDpi xmlns:a14="http://schemas.microsoft.com/office/drawing/2010/main" val="0"/>
+              </a:ext>
+            </a:extLst>
+          </a:blip>
+          <a:srcRect/>
+          <a:stretch>
+            <a:fillRect/>
+          </a:stretch>
+        </p:blipFill>
+        <p:spPr bwMode="auto">
+          <a:xfrm>
+            <a:off x="8055407" y="3019881"/>
+            <a:ext cx="707886" cy="707886"/>
           </a:xfrm>
           <a:prstGeom prst="rect">
             <a:avLst/>

</xml_diff>